<commit_message>
react - continue pages
</commit_message>
<xml_diff>
--- a/FrameIt/מסך.pptx
+++ b/FrameIt/מסך.pptx
@@ -106,6 +106,11 @@
       </a:defRPr>
     </a:lvl9pPr>
   </p:defaultTextStyle>
+  <p:extLst>
+    <p:ext uri="{EFAFB233-063F-42B5-8137-9DF3F51BA10A}">
+      <p15:sldGuideLst xmlns:p15="http://schemas.microsoft.com/office/powerpoint/2012/main"/>
+    </p:ext>
+  </p:extLst>
 </p:presentation>
 </file>
 
@@ -256,7 +261,7 @@
           <a:p>
             <a:fld id="{DC95B4DA-857A-433E-94F6-7593F765041C}" type="datetimeFigureOut">
               <a:rPr lang="he-IL" smtClean="0"/>
-              <a:t>ג'/אדר/תשפ"ה</a:t>
+              <a:t>י"ז/אדר/תשפ"ה</a:t>
             </a:fld>
             <a:endParaRPr lang="he-IL"/>
           </a:p>
@@ -454,7 +459,7 @@
           <a:p>
             <a:fld id="{DC95B4DA-857A-433E-94F6-7593F765041C}" type="datetimeFigureOut">
               <a:rPr lang="he-IL" smtClean="0"/>
-              <a:t>ג'/אדר/תשפ"ה</a:t>
+              <a:t>י"ז/אדר/תשפ"ה</a:t>
             </a:fld>
             <a:endParaRPr lang="he-IL"/>
           </a:p>
@@ -662,7 +667,7 @@
           <a:p>
             <a:fld id="{DC95B4DA-857A-433E-94F6-7593F765041C}" type="datetimeFigureOut">
               <a:rPr lang="he-IL" smtClean="0"/>
-              <a:t>ג'/אדר/תשפ"ה</a:t>
+              <a:t>י"ז/אדר/תשפ"ה</a:t>
             </a:fld>
             <a:endParaRPr lang="he-IL"/>
           </a:p>
@@ -860,7 +865,7 @@
           <a:p>
             <a:fld id="{DC95B4DA-857A-433E-94F6-7593F765041C}" type="datetimeFigureOut">
               <a:rPr lang="he-IL" smtClean="0"/>
-              <a:t>ג'/אדר/תשפ"ה</a:t>
+              <a:t>י"ז/אדר/תשפ"ה</a:t>
             </a:fld>
             <a:endParaRPr lang="he-IL"/>
           </a:p>
@@ -1135,7 +1140,7 @@
           <a:p>
             <a:fld id="{DC95B4DA-857A-433E-94F6-7593F765041C}" type="datetimeFigureOut">
               <a:rPr lang="he-IL" smtClean="0"/>
-              <a:t>ג'/אדר/תשפ"ה</a:t>
+              <a:t>י"ז/אדר/תשפ"ה</a:t>
             </a:fld>
             <a:endParaRPr lang="he-IL"/>
           </a:p>
@@ -1400,7 +1405,7 @@
           <a:p>
             <a:fld id="{DC95B4DA-857A-433E-94F6-7593F765041C}" type="datetimeFigureOut">
               <a:rPr lang="he-IL" smtClean="0"/>
-              <a:t>ג'/אדר/תשפ"ה</a:t>
+              <a:t>י"ז/אדר/תשפ"ה</a:t>
             </a:fld>
             <a:endParaRPr lang="he-IL"/>
           </a:p>
@@ -1812,7 +1817,7 @@
           <a:p>
             <a:fld id="{DC95B4DA-857A-433E-94F6-7593F765041C}" type="datetimeFigureOut">
               <a:rPr lang="he-IL" smtClean="0"/>
-              <a:t>ג'/אדר/תשפ"ה</a:t>
+              <a:t>י"ז/אדר/תשפ"ה</a:t>
             </a:fld>
             <a:endParaRPr lang="he-IL"/>
           </a:p>
@@ -1953,7 +1958,7 @@
           <a:p>
             <a:fld id="{DC95B4DA-857A-433E-94F6-7593F765041C}" type="datetimeFigureOut">
               <a:rPr lang="he-IL" smtClean="0"/>
-              <a:t>ג'/אדר/תשפ"ה</a:t>
+              <a:t>י"ז/אדר/תשפ"ה</a:t>
             </a:fld>
             <a:endParaRPr lang="he-IL"/>
           </a:p>
@@ -2066,7 +2071,7 @@
           <a:p>
             <a:fld id="{DC95B4DA-857A-433E-94F6-7593F765041C}" type="datetimeFigureOut">
               <a:rPr lang="he-IL" smtClean="0"/>
-              <a:t>ג'/אדר/תשפ"ה</a:t>
+              <a:t>י"ז/אדר/תשפ"ה</a:t>
             </a:fld>
             <a:endParaRPr lang="he-IL"/>
           </a:p>
@@ -2377,7 +2382,7 @@
           <a:p>
             <a:fld id="{DC95B4DA-857A-433E-94F6-7593F765041C}" type="datetimeFigureOut">
               <a:rPr lang="he-IL" smtClean="0"/>
-              <a:t>ג'/אדר/תשפ"ה</a:t>
+              <a:t>י"ז/אדר/תשפ"ה</a:t>
             </a:fld>
             <a:endParaRPr lang="he-IL"/>
           </a:p>
@@ -2665,7 +2670,7 @@
           <a:p>
             <a:fld id="{DC95B4DA-857A-433E-94F6-7593F765041C}" type="datetimeFigureOut">
               <a:rPr lang="he-IL" smtClean="0"/>
-              <a:t>ג'/אדר/תשפ"ה</a:t>
+              <a:t>י"ז/אדר/תשפ"ה</a:t>
             </a:fld>
             <a:endParaRPr lang="he-IL"/>
           </a:p>
@@ -2906,7 +2911,7 @@
           <a:p>
             <a:fld id="{DC95B4DA-857A-433E-94F6-7593F765041C}" type="datetimeFigureOut">
               <a:rPr lang="he-IL" smtClean="0"/>
-              <a:t>ג'/אדר/תשפ"ה</a:t>
+              <a:t>י"ז/אדר/תשפ"ה</a:t>
             </a:fld>
             <a:endParaRPr lang="he-IL"/>
           </a:p>
@@ -4470,307 +4475,6 @@
       </p:sp>
       <p:sp>
         <p:nvSpPr>
-          <p:cNvPr id="23" name="מלבן 22">
-            <a:extLst>
-              <a:ext uri="{FF2B5EF4-FFF2-40B4-BE49-F238E27FC236}">
-                <a16:creationId xmlns:a16="http://schemas.microsoft.com/office/drawing/2014/main" id="{FD836979-11EE-474C-A912-DD3C12A08A83}"/>
-              </a:ext>
-            </a:extLst>
-          </p:cNvPr>
-          <p:cNvSpPr/>
-          <p:nvPr/>
-        </p:nvSpPr>
-        <p:spPr>
-          <a:xfrm>
-            <a:off x="705394" y="6095180"/>
-            <a:ext cx="1162592" cy="264828"/>
-          </a:xfrm>
-          <a:prstGeom prst="rect">
-            <a:avLst/>
-          </a:prstGeom>
-        </p:spPr>
-        <p:style>
-          <a:lnRef idx="2">
-            <a:schemeClr val="accent1">
-              <a:shade val="50000"/>
-            </a:schemeClr>
-          </a:lnRef>
-          <a:fillRef idx="1">
-            <a:schemeClr val="accent1"/>
-          </a:fillRef>
-          <a:effectRef idx="0">
-            <a:schemeClr val="accent1"/>
-          </a:effectRef>
-          <a:fontRef idx="minor">
-            <a:schemeClr val="lt1"/>
-          </a:fontRef>
-        </p:style>
-        <p:txBody>
-          <a:bodyPr rtlCol="1" anchor="ctr"/>
-          <a:lstStyle/>
-          <a:p>
-            <a:pPr algn="ctr"/>
-            <a:r>
-              <a:rPr lang="en-US" dirty="0"/>
-              <a:t>preview</a:t>
-            </a:r>
-            <a:endParaRPr lang="he-IL" dirty="0"/>
-          </a:p>
-        </p:txBody>
-      </p:sp>
-      <p:grpSp>
-        <p:nvGrpSpPr>
-          <p:cNvPr id="29" name="קבוצה 28">
-            <a:extLst>
-              <a:ext uri="{FF2B5EF4-FFF2-40B4-BE49-F238E27FC236}">
-                <a16:creationId xmlns:a16="http://schemas.microsoft.com/office/drawing/2014/main" id="{3B598B2C-77AE-4AF1-8955-DB1F9E8DCF75}"/>
-              </a:ext>
-            </a:extLst>
-          </p:cNvPr>
-          <p:cNvGrpSpPr/>
-          <p:nvPr/>
-        </p:nvGrpSpPr>
-        <p:grpSpPr>
-          <a:xfrm>
-            <a:off x="866738" y="6447876"/>
-            <a:ext cx="600653" cy="130630"/>
-            <a:chOff x="5499940" y="3206931"/>
-            <a:chExt cx="913923" cy="261259"/>
-          </a:xfrm>
-        </p:grpSpPr>
-        <p:sp>
-          <p:nvSpPr>
-            <p:cNvPr id="24" name="משולש שווה-שוקיים 23">
-              <a:extLst>
-                <a:ext uri="{FF2B5EF4-FFF2-40B4-BE49-F238E27FC236}">
-                  <a16:creationId xmlns:a16="http://schemas.microsoft.com/office/drawing/2014/main" id="{D8290DB3-3DC0-4427-BA02-AB6635593A22}"/>
-                </a:ext>
-              </a:extLst>
-            </p:cNvPr>
-            <p:cNvSpPr/>
-            <p:nvPr/>
-          </p:nvSpPr>
-          <p:spPr>
-            <a:xfrm rot="5400000">
-              <a:off x="6191794" y="3246120"/>
-              <a:ext cx="261257" cy="182880"/>
-            </a:xfrm>
-            <a:prstGeom prst="triangle">
-              <a:avLst/>
-            </a:prstGeom>
-          </p:spPr>
-          <p:style>
-            <a:lnRef idx="2">
-              <a:schemeClr val="accent1">
-                <a:shade val="50000"/>
-              </a:schemeClr>
-            </a:lnRef>
-            <a:fillRef idx="1">
-              <a:schemeClr val="accent1"/>
-            </a:fillRef>
-            <a:effectRef idx="0">
-              <a:schemeClr val="accent1"/>
-            </a:effectRef>
-            <a:fontRef idx="minor">
-              <a:schemeClr val="lt1"/>
-            </a:fontRef>
-          </p:style>
-          <p:txBody>
-            <a:bodyPr rtlCol="1" anchor="ctr"/>
-            <a:lstStyle/>
-            <a:p>
-              <a:pPr algn="ctr"/>
-              <a:endParaRPr lang="he-IL"/>
-            </a:p>
-          </p:txBody>
-        </p:sp>
-        <p:sp>
-          <p:nvSpPr>
-            <p:cNvPr id="25" name="מלבן 24">
-              <a:extLst>
-                <a:ext uri="{FF2B5EF4-FFF2-40B4-BE49-F238E27FC236}">
-                  <a16:creationId xmlns:a16="http://schemas.microsoft.com/office/drawing/2014/main" id="{D1B8CBD9-7FCF-45E4-8978-9DC97B1532E7}"/>
-                </a:ext>
-              </a:extLst>
-            </p:cNvPr>
-            <p:cNvSpPr/>
-            <p:nvPr/>
-          </p:nvSpPr>
-          <p:spPr>
-            <a:xfrm>
-              <a:off x="6140631" y="3206932"/>
-              <a:ext cx="45719" cy="261258"/>
-            </a:xfrm>
-            <a:prstGeom prst="rect">
-              <a:avLst/>
-            </a:prstGeom>
-          </p:spPr>
-          <p:style>
-            <a:lnRef idx="2">
-              <a:schemeClr val="accent1">
-                <a:shade val="50000"/>
-              </a:schemeClr>
-            </a:lnRef>
-            <a:fillRef idx="1">
-              <a:schemeClr val="accent1"/>
-            </a:fillRef>
-            <a:effectRef idx="0">
-              <a:schemeClr val="accent1"/>
-            </a:effectRef>
-            <a:fontRef idx="minor">
-              <a:schemeClr val="lt1"/>
-            </a:fontRef>
-          </p:style>
-          <p:txBody>
-            <a:bodyPr rtlCol="1" anchor="ctr"/>
-            <a:lstStyle/>
-            <a:p>
-              <a:pPr algn="ctr"/>
-              <a:endParaRPr lang="he-IL"/>
-            </a:p>
-          </p:txBody>
-        </p:sp>
-        <p:sp>
-          <p:nvSpPr>
-            <p:cNvPr id="26" name="משולש שווה-שוקיים 25">
-              <a:extLst>
-                <a:ext uri="{FF2B5EF4-FFF2-40B4-BE49-F238E27FC236}">
-                  <a16:creationId xmlns:a16="http://schemas.microsoft.com/office/drawing/2014/main" id="{5D42EFEC-835F-4E7B-AFCC-86699E6E5BE4}"/>
-                </a:ext>
-              </a:extLst>
-            </p:cNvPr>
-            <p:cNvSpPr/>
-            <p:nvPr/>
-          </p:nvSpPr>
-          <p:spPr>
-            <a:xfrm rot="16200000">
-              <a:off x="5460751" y="3246120"/>
-              <a:ext cx="261257" cy="182880"/>
-            </a:xfrm>
-            <a:prstGeom prst="triangle">
-              <a:avLst/>
-            </a:prstGeom>
-          </p:spPr>
-          <p:style>
-            <a:lnRef idx="2">
-              <a:schemeClr val="accent1">
-                <a:shade val="50000"/>
-              </a:schemeClr>
-            </a:lnRef>
-            <a:fillRef idx="1">
-              <a:schemeClr val="accent1"/>
-            </a:fillRef>
-            <a:effectRef idx="0">
-              <a:schemeClr val="accent1"/>
-            </a:effectRef>
-            <a:fontRef idx="minor">
-              <a:schemeClr val="lt1"/>
-            </a:fontRef>
-          </p:style>
-          <p:txBody>
-            <a:bodyPr rtlCol="1" anchor="ctr"/>
-            <a:lstStyle/>
-            <a:p>
-              <a:pPr algn="ctr"/>
-              <a:endParaRPr lang="he-IL"/>
-            </a:p>
-          </p:txBody>
-        </p:sp>
-        <p:sp>
-          <p:nvSpPr>
-            <p:cNvPr id="27" name="מלבן 26">
-              <a:extLst>
-                <a:ext uri="{FF2B5EF4-FFF2-40B4-BE49-F238E27FC236}">
-                  <a16:creationId xmlns:a16="http://schemas.microsoft.com/office/drawing/2014/main" id="{9F496C6F-DBDA-4B90-93D7-4769242DF80F}"/>
-                </a:ext>
-              </a:extLst>
-            </p:cNvPr>
-            <p:cNvSpPr/>
-            <p:nvPr/>
-          </p:nvSpPr>
-          <p:spPr>
-            <a:xfrm rot="10800000">
-              <a:off x="5727452" y="3206931"/>
-              <a:ext cx="45719" cy="261258"/>
-            </a:xfrm>
-            <a:prstGeom prst="rect">
-              <a:avLst/>
-            </a:prstGeom>
-          </p:spPr>
-          <p:style>
-            <a:lnRef idx="2">
-              <a:schemeClr val="accent1">
-                <a:shade val="50000"/>
-              </a:schemeClr>
-            </a:lnRef>
-            <a:fillRef idx="1">
-              <a:schemeClr val="accent1"/>
-            </a:fillRef>
-            <a:effectRef idx="0">
-              <a:schemeClr val="accent1"/>
-            </a:effectRef>
-            <a:fontRef idx="minor">
-              <a:schemeClr val="lt1"/>
-            </a:fontRef>
-          </p:style>
-          <p:txBody>
-            <a:bodyPr rtlCol="1" anchor="ctr"/>
-            <a:lstStyle/>
-            <a:p>
-              <a:pPr algn="ctr"/>
-              <a:endParaRPr lang="he-IL"/>
-            </a:p>
-          </p:txBody>
-        </p:sp>
-        <p:sp>
-          <p:nvSpPr>
-            <p:cNvPr id="28" name="מלבן 27">
-              <a:extLst>
-                <a:ext uri="{FF2B5EF4-FFF2-40B4-BE49-F238E27FC236}">
-                  <a16:creationId xmlns:a16="http://schemas.microsoft.com/office/drawing/2014/main" id="{152B85BD-4672-44DC-BD1D-0E1DE146A879}"/>
-                </a:ext>
-              </a:extLst>
-            </p:cNvPr>
-            <p:cNvSpPr/>
-            <p:nvPr/>
-          </p:nvSpPr>
-          <p:spPr>
-            <a:xfrm>
-              <a:off x="5905908" y="3278981"/>
-              <a:ext cx="109538" cy="109537"/>
-            </a:xfrm>
-            <a:prstGeom prst="rect">
-              <a:avLst/>
-            </a:prstGeom>
-          </p:spPr>
-          <p:style>
-            <a:lnRef idx="2">
-              <a:schemeClr val="accent1">
-                <a:shade val="50000"/>
-              </a:schemeClr>
-            </a:lnRef>
-            <a:fillRef idx="1">
-              <a:schemeClr val="accent1"/>
-            </a:fillRef>
-            <a:effectRef idx="0">
-              <a:schemeClr val="accent1"/>
-            </a:effectRef>
-            <a:fontRef idx="minor">
-              <a:schemeClr val="lt1"/>
-            </a:fontRef>
-          </p:style>
-          <p:txBody>
-            <a:bodyPr rtlCol="1" anchor="ctr"/>
-            <a:lstStyle/>
-            <a:p>
-              <a:pPr algn="ctr"/>
-              <a:endParaRPr lang="he-IL"/>
-            </a:p>
-          </p:txBody>
-        </p:sp>
-      </p:grpSp>
-      <p:sp>
-        <p:nvSpPr>
           <p:cNvPr id="30" name="מלבן 29">
             <a:extLst>
               <a:ext uri="{FF2B5EF4-FFF2-40B4-BE49-F238E27FC236}">

</xml_diff>